<commit_message>
Updated Conclusion and Gnatt Chart
</commit_message>
<xml_diff>
--- a/Project Proposal New.pptx
+++ b/Project Proposal New.pptx
@@ -25,8 +25,8 @@
     <p:sldId id="275" r:id="rId19"/>
     <p:sldId id="276" r:id="rId20"/>
     <p:sldId id="264" r:id="rId21"/>
-    <p:sldId id="265" r:id="rId22"/>
-    <p:sldId id="281" r:id="rId23"/>
+    <p:sldId id="281" r:id="rId22"/>
+    <p:sldId id="265" r:id="rId23"/>
     <p:sldId id="266" r:id="rId24"/>
   </p:sldIdLst>
   <p:sldSz cx="12192000" cy="6858000"/>
@@ -23264,8 +23264,6 @@
               <a:lnSpc>
                 <a:spcPct val="110000"/>
               </a:lnSpc>
-              <a:buFont typeface="Wingdings" panose="05000000000000000000" pitchFamily="2" charset="2"/>
-              <a:buChar char="v"/>
             </a:pPr>
             <a:r>
               <a:rPr lang="en-US" b="1" dirty="0">
@@ -23282,8 +23280,6 @@
               <a:lnSpc>
                 <a:spcPct val="110000"/>
               </a:lnSpc>
-              <a:buFont typeface="Wingdings" panose="05000000000000000000" pitchFamily="2" charset="2"/>
-              <a:buChar char="v"/>
             </a:pPr>
             <a:r>
               <a:rPr lang="en-US" b="1" dirty="0">
@@ -23300,8 +23296,6 @@
               <a:lnSpc>
                 <a:spcPct val="110000"/>
               </a:lnSpc>
-              <a:buFont typeface="Wingdings" panose="05000000000000000000" pitchFamily="2" charset="2"/>
-              <a:buChar char="v"/>
             </a:pPr>
             <a:r>
               <a:rPr lang="en-US" b="1" dirty="0">
@@ -23318,8 +23312,6 @@
               <a:lnSpc>
                 <a:spcPct val="110000"/>
               </a:lnSpc>
-              <a:buFont typeface="Wingdings" panose="05000000000000000000" pitchFamily="2" charset="2"/>
-              <a:buChar char="v"/>
             </a:pPr>
             <a:r>
               <a:rPr lang="en-US" b="1" dirty="0">
@@ -23336,8 +23328,6 @@
               <a:lnSpc>
                 <a:spcPct val="110000"/>
               </a:lnSpc>
-              <a:buFont typeface="Wingdings" panose="05000000000000000000" pitchFamily="2" charset="2"/>
-              <a:buChar char="v"/>
             </a:pPr>
             <a:r>
               <a:rPr lang="en-US" b="1" dirty="0">
@@ -24375,6 +24365,9 @@
             <a:lin ang="5400000" scaled="1"/>
             <a:tileRect/>
           </a:gradFill>
+          <a:effectLst>
+            <a:softEdge rad="127000"/>
+          </a:effectLst>
         </p:spPr>
         <p:txBody>
           <a:bodyPr/>
@@ -24861,7 +24854,7 @@
           <p:cNvPr id="2" name="Title 1">
             <a:extLst>
               <a:ext uri="{FF2B5EF4-FFF2-40B4-BE49-F238E27FC236}">
-                <a16:creationId xmlns:a16="http://schemas.microsoft.com/office/drawing/2014/main" id="{D4F5FDAE-9A9D-4123-9DA3-50250AFDF80B}"/>
+                <a16:creationId xmlns:a16="http://schemas.microsoft.com/office/drawing/2014/main" id="{E1B9030C-6073-4349-981E-A881A5B686BC}"/>
               </a:ext>
             </a:extLst>
           </p:cNvPr>
@@ -24874,8 +24867,8 @@
         </p:nvSpPr>
         <p:spPr>
           <a:xfrm>
-            <a:off x="997844" y="153179"/>
-            <a:ext cx="10515600" cy="1325563"/>
+            <a:off x="1650609" y="-126609"/>
+            <a:ext cx="8890782" cy="998805"/>
           </a:xfrm>
         </p:spPr>
         <p:txBody>
@@ -24886,48 +24879,23 @@
           <a:p>
             <a:pPr algn="ctr"/>
             <a:r>
-              <a:rPr lang="en-US" sz="7200" b="1" dirty="0">
+              <a:rPr lang="en-US" sz="6000" b="1" dirty="0">
                 <a:solidFill>
                   <a:schemeClr val="bg1"/>
                 </a:solidFill>
                 <a:latin typeface="Agency FB" panose="020B0503020202020204" pitchFamily="34" charset="0"/>
               </a:rPr>
-              <a:t>Conclusion</a:t>
+              <a:t>Project Management Plan</a:t>
             </a:r>
           </a:p>
         </p:txBody>
       </p:sp>
-      <p:sp>
-        <p:nvSpPr>
-          <p:cNvPr id="3" name="Content Placeholder 2">
+      <p:pic>
+        <p:nvPicPr>
+          <p:cNvPr id="9" name="Picture 8">
             <a:extLst>
               <a:ext uri="{FF2B5EF4-FFF2-40B4-BE49-F238E27FC236}">
-                <a16:creationId xmlns:a16="http://schemas.microsoft.com/office/drawing/2014/main" id="{72D72FE2-AEEE-4130-9E68-C2ED5E36FFE0}"/>
-              </a:ext>
-            </a:extLst>
-          </p:cNvPr>
-          <p:cNvSpPr>
-            <a:spLocks noGrp="1"/>
-          </p:cNvSpPr>
-          <p:nvPr>
-            <p:ph idx="1"/>
-          </p:nvPr>
-        </p:nvSpPr>
-        <p:spPr/>
-        <p:txBody>
-          <a:bodyPr/>
-          <a:lstStyle/>
-          <a:p>
-            <a:endParaRPr lang="en-US" dirty="0"/>
-          </a:p>
-        </p:txBody>
-      </p:sp>
-      <p:pic>
-        <p:nvPicPr>
-          <p:cNvPr id="4" name="Picture 3" descr="A picture containing text, clipart&#10;&#10;Description automatically generated">
-            <a:extLst>
-              <a:ext uri="{FF2B5EF4-FFF2-40B4-BE49-F238E27FC236}">
-                <a16:creationId xmlns:a16="http://schemas.microsoft.com/office/drawing/2014/main" id="{BB52B6DC-9A80-4F04-8879-A90436E9C94D}"/>
+                <a16:creationId xmlns:a16="http://schemas.microsoft.com/office/drawing/2014/main" id="{924DFABA-BD71-49E6-9126-1D87AFB43A49}"/>
               </a:ext>
             </a:extLst>
           </p:cNvPr>
@@ -24939,6 +24907,21 @@
         <p:blipFill>
           <a:blip r:embed="rId2">
             <a:extLst>
+              <a:ext uri="{BEBA8EAE-BF5A-486C-A8C5-ECC9F3942E4B}">
+                <a14:imgProps xmlns:a14="http://schemas.microsoft.com/office/drawing/2010/main">
+                  <a14:imgLayer r:embed="rId3">
+                    <a14:imgEffect>
+                      <a14:colorTemperature colorTemp="11500"/>
+                    </a14:imgEffect>
+                    <a14:imgEffect>
+                      <a14:saturation sat="0"/>
+                    </a14:imgEffect>
+                    <a14:imgEffect>
+                      <a14:brightnessContrast bright="3000" contrast="-39000"/>
+                    </a14:imgEffect>
+                  </a14:imgLayer>
+                </a14:imgProps>
+              </a:ext>
               <a:ext uri="{28A0092B-C50C-407E-A947-70E740481C1C}">
                 <a14:useLocalDpi xmlns:a14="http://schemas.microsoft.com/office/drawing/2010/main" val="0"/>
               </a:ext>
@@ -24950,44 +24933,8 @@
         </p:blipFill>
         <p:spPr>
           <a:xfrm>
-            <a:off x="295812" y="337041"/>
-            <a:ext cx="1514231" cy="957840"/>
-          </a:xfrm>
-          <a:prstGeom prst="rect">
-            <a:avLst/>
-          </a:prstGeom>
-        </p:spPr>
-      </p:pic>
-      <p:pic>
-        <p:nvPicPr>
-          <p:cNvPr id="5" name="Picture 4">
-            <a:extLst>
-              <a:ext uri="{FF2B5EF4-FFF2-40B4-BE49-F238E27FC236}">
-                <a16:creationId xmlns:a16="http://schemas.microsoft.com/office/drawing/2014/main" id="{5F2A9445-2878-4FD6-A7F4-1F27757D3FC2}"/>
-              </a:ext>
-            </a:extLst>
-          </p:cNvPr>
-          <p:cNvPicPr>
-            <a:picLocks noChangeAspect="1"/>
-          </p:cNvPicPr>
-          <p:nvPr/>
-        </p:nvPicPr>
-        <p:blipFill>
-          <a:blip r:embed="rId3">
-            <a:extLst>
-              <a:ext uri="{28A0092B-C50C-407E-A947-70E740481C1C}">
-                <a14:useLocalDpi xmlns:a14="http://schemas.microsoft.com/office/drawing/2010/main" val="0"/>
-              </a:ext>
-            </a:extLst>
-          </a:blip>
-          <a:stretch>
-            <a:fillRect/>
-          </a:stretch>
-        </p:blipFill>
-        <p:spPr>
-          <a:xfrm>
-            <a:off x="10701244" y="337041"/>
-            <a:ext cx="1194944" cy="1495799"/>
+            <a:off x="1024597" y="872196"/>
+            <a:ext cx="10142806" cy="5769903"/>
           </a:xfrm>
           <a:prstGeom prst="rect">
             <a:avLst/>
@@ -24997,7 +24944,7 @@
     </p:spTree>
     <p:extLst>
       <p:ext uri="{BB962C8B-B14F-4D97-AF65-F5344CB8AC3E}">
-        <p14:creationId xmlns:p14="http://schemas.microsoft.com/office/powerpoint/2010/main" val="2781614471"/>
+        <p14:creationId xmlns:p14="http://schemas.microsoft.com/office/powerpoint/2010/main" val="427407865"/>
       </p:ext>
     </p:extLst>
   </p:cSld>
@@ -25221,7 +25168,7 @@
           <p:cNvPr id="2" name="Title 1">
             <a:extLst>
               <a:ext uri="{FF2B5EF4-FFF2-40B4-BE49-F238E27FC236}">
-                <a16:creationId xmlns:a16="http://schemas.microsoft.com/office/drawing/2014/main" id="{E1B9030C-6073-4349-981E-A881A5B686BC}"/>
+                <a16:creationId xmlns:a16="http://schemas.microsoft.com/office/drawing/2014/main" id="{D4F5FDAE-9A9D-4123-9DA3-50250AFDF80B}"/>
               </a:ext>
             </a:extLst>
           </p:cNvPr>
@@ -25232,19 +25179,196 @@
             <p:ph type="title"/>
           </p:nvPr>
         </p:nvSpPr>
-        <p:spPr/>
+        <p:spPr>
+          <a:xfrm>
+            <a:off x="997844" y="153179"/>
+            <a:ext cx="10515600" cy="1325563"/>
+          </a:xfrm>
+        </p:spPr>
         <p:txBody>
-          <a:bodyPr/>
+          <a:bodyPr>
+            <a:normAutofit/>
+          </a:bodyPr>
           <a:lstStyle/>
           <a:p>
-            <a:endParaRPr lang="en-US"/>
+            <a:pPr algn="ctr"/>
+            <a:r>
+              <a:rPr lang="en-US" sz="7200" b="1" dirty="0">
+                <a:solidFill>
+                  <a:schemeClr val="bg1"/>
+                </a:solidFill>
+                <a:latin typeface="Agency FB" panose="020B0503020202020204" pitchFamily="34" charset="0"/>
+              </a:rPr>
+              <a:t>Conclusion</a:t>
+            </a:r>
           </a:p>
         </p:txBody>
       </p:sp>
+      <p:sp>
+        <p:nvSpPr>
+          <p:cNvPr id="3" name="Content Placeholder 2">
+            <a:extLst>
+              <a:ext uri="{FF2B5EF4-FFF2-40B4-BE49-F238E27FC236}">
+                <a16:creationId xmlns:a16="http://schemas.microsoft.com/office/drawing/2014/main" id="{72D72FE2-AEEE-4130-9E68-C2ED5E36FFE0}"/>
+              </a:ext>
+            </a:extLst>
+          </p:cNvPr>
+          <p:cNvSpPr>
+            <a:spLocks noGrp="1"/>
+          </p:cNvSpPr>
+          <p:nvPr>
+            <p:ph idx="1"/>
+          </p:nvPr>
+        </p:nvSpPr>
+        <p:spPr>
+          <a:xfrm>
+            <a:off x="838200" y="2489801"/>
+            <a:ext cx="10515600" cy="2535360"/>
+          </a:xfrm>
+          <a:gradFill flip="none" rotWithShape="1">
+            <a:gsLst>
+              <a:gs pos="0">
+                <a:schemeClr val="accent1">
+                  <a:shade val="30000"/>
+                  <a:satMod val="115000"/>
+                  <a:alpha val="0"/>
+                </a:schemeClr>
+              </a:gs>
+              <a:gs pos="50000">
+                <a:schemeClr val="accent1">
+                  <a:shade val="67500"/>
+                  <a:satMod val="115000"/>
+                </a:schemeClr>
+              </a:gs>
+              <a:gs pos="100000">
+                <a:schemeClr val="accent1">
+                  <a:shade val="100000"/>
+                  <a:satMod val="115000"/>
+                </a:schemeClr>
+              </a:gs>
+            </a:gsLst>
+            <a:lin ang="5400000" scaled="1"/>
+            <a:tileRect/>
+          </a:gradFill>
+          <a:effectLst>
+            <a:softEdge rad="635000"/>
+          </a:effectLst>
+        </p:spPr>
+        <p:txBody>
+          <a:bodyPr>
+            <a:normAutofit/>
+          </a:bodyPr>
+          <a:lstStyle/>
+          <a:p>
+            <a:pPr marL="0" indent="0" algn="just">
+              <a:buNone/>
+            </a:pPr>
+            <a:r>
+              <a:rPr lang="en-US" sz="4400" b="1" dirty="0">
+                <a:solidFill>
+                  <a:schemeClr val="bg1"/>
+                </a:solidFill>
+                <a:latin typeface="Agency FB" panose="020B0503020202020204" pitchFamily="34" charset="0"/>
+              </a:rPr>
+              <a:t>Our main goal is to implement a fully automated system for </a:t>
+            </a:r>
+            <a:r>
+              <a:rPr lang="en-US" sz="4400" b="1" dirty="0" err="1">
+                <a:solidFill>
+                  <a:schemeClr val="bg1"/>
+                </a:solidFill>
+                <a:latin typeface="Agency FB" panose="020B0503020202020204" pitchFamily="34" charset="0"/>
+              </a:rPr>
+              <a:t>Herath</a:t>
+            </a:r>
+            <a:r>
+              <a:rPr lang="en-US" sz="4400" b="1" dirty="0">
+                <a:solidFill>
+                  <a:schemeClr val="bg1"/>
+                </a:solidFill>
+                <a:latin typeface="Agency FB" panose="020B0503020202020204" pitchFamily="34" charset="0"/>
+              </a:rPr>
+              <a:t> Metal Crushers to get their work done easily and to carry out the business processes effectively &amp; efficiently.</a:t>
+            </a:r>
+          </a:p>
+        </p:txBody>
+      </p:sp>
+      <p:pic>
+        <p:nvPicPr>
+          <p:cNvPr id="4" name="Picture 3" descr="A picture containing text, clipart&#10;&#10;Description automatically generated">
+            <a:extLst>
+              <a:ext uri="{FF2B5EF4-FFF2-40B4-BE49-F238E27FC236}">
+                <a16:creationId xmlns:a16="http://schemas.microsoft.com/office/drawing/2014/main" id="{BB52B6DC-9A80-4F04-8879-A90436E9C94D}"/>
+              </a:ext>
+            </a:extLst>
+          </p:cNvPr>
+          <p:cNvPicPr>
+            <a:picLocks noChangeAspect="1"/>
+          </p:cNvPicPr>
+          <p:nvPr/>
+        </p:nvPicPr>
+        <p:blipFill>
+          <a:blip r:embed="rId2">
+            <a:extLst>
+              <a:ext uri="{28A0092B-C50C-407E-A947-70E740481C1C}">
+                <a14:useLocalDpi xmlns:a14="http://schemas.microsoft.com/office/drawing/2010/main" val="0"/>
+              </a:ext>
+            </a:extLst>
+          </a:blip>
+          <a:stretch>
+            <a:fillRect/>
+          </a:stretch>
+        </p:blipFill>
+        <p:spPr>
+          <a:xfrm>
+            <a:off x="295812" y="337041"/>
+            <a:ext cx="1514231" cy="957840"/>
+          </a:xfrm>
+          <a:prstGeom prst="rect">
+            <a:avLst/>
+          </a:prstGeom>
+        </p:spPr>
+      </p:pic>
+      <p:pic>
+        <p:nvPicPr>
+          <p:cNvPr id="5" name="Picture 4">
+            <a:extLst>
+              <a:ext uri="{FF2B5EF4-FFF2-40B4-BE49-F238E27FC236}">
+                <a16:creationId xmlns:a16="http://schemas.microsoft.com/office/drawing/2014/main" id="{5F2A9445-2878-4FD6-A7F4-1F27757D3FC2}"/>
+              </a:ext>
+            </a:extLst>
+          </p:cNvPr>
+          <p:cNvPicPr>
+            <a:picLocks noChangeAspect="1"/>
+          </p:cNvPicPr>
+          <p:nvPr/>
+        </p:nvPicPr>
+        <p:blipFill>
+          <a:blip r:embed="rId3">
+            <a:extLst>
+              <a:ext uri="{28A0092B-C50C-407E-A947-70E740481C1C}">
+                <a14:useLocalDpi xmlns:a14="http://schemas.microsoft.com/office/drawing/2010/main" val="0"/>
+              </a:ext>
+            </a:extLst>
+          </a:blip>
+          <a:stretch>
+            <a:fillRect/>
+          </a:stretch>
+        </p:blipFill>
+        <p:spPr>
+          <a:xfrm>
+            <a:off x="10701244" y="337041"/>
+            <a:ext cx="1194944" cy="1495799"/>
+          </a:xfrm>
+          <a:prstGeom prst="rect">
+            <a:avLst/>
+          </a:prstGeom>
+        </p:spPr>
+      </p:pic>
     </p:spTree>
     <p:extLst>
       <p:ext uri="{BB962C8B-B14F-4D97-AF65-F5344CB8AC3E}">
-        <p14:creationId xmlns:p14="http://schemas.microsoft.com/office/powerpoint/2010/main" val="427407865"/>
+        <p14:creationId xmlns:p14="http://schemas.microsoft.com/office/powerpoint/2010/main" val="2781614471"/>
       </p:ext>
     </p:extLst>
   </p:cSld>

</xml_diff>